<commit_message>
Updated Graphs for PPT
</commit_message>
<xml_diff>
--- a/Final_Project/Presentation.pptx
+++ b/Final_Project/Presentation.pptx
@@ -6,7 +6,11 @@
   </p:sldMasterIdLst>
   <p:sldIdLst>
     <p:sldId id="256" r:id="rId2"/>
-    <p:sldId id="257" r:id="rId3"/>
+    <p:sldId id="258" r:id="rId3"/>
+    <p:sldId id="257" r:id="rId4"/>
+    <p:sldId id="259" r:id="rId5"/>
+    <p:sldId id="260" r:id="rId6"/>
+    <p:sldId id="261" r:id="rId7"/>
   </p:sldIdLst>
   <p:sldSz cx="12192000" cy="6858000"/>
   <p:notesSz cx="6858000" cy="9144000"/>
@@ -105,6 +109,11 @@
       </a:defRPr>
     </a:lvl9pPr>
   </p:defaultTextStyle>
+  <p:extLst>
+    <p:ext uri="{EFAFB233-063F-42B5-8137-9DF3F51BA10A}">
+      <p15:sldGuideLst xmlns:p15="http://schemas.microsoft.com/office/powerpoint/2012/main"/>
+    </p:ext>
+  </p:extLst>
 </p:presentation>
 </file>
 
@@ -255,7 +264,7 @@
           <a:p>
             <a:fld id="{833070CE-4CF3-4BD2-9D46-3CFBC9E43154}" type="datetimeFigureOut">
               <a:rPr lang="en-US" smtClean="0"/>
-              <a:t>11/27/2021</a:t>
+              <a:t>11/29/2021</a:t>
             </a:fld>
             <a:endParaRPr lang="en-US"/>
           </a:p>
@@ -453,7 +462,7 @@
           <a:p>
             <a:fld id="{833070CE-4CF3-4BD2-9D46-3CFBC9E43154}" type="datetimeFigureOut">
               <a:rPr lang="en-US" smtClean="0"/>
-              <a:t>11/27/2021</a:t>
+              <a:t>11/29/2021</a:t>
             </a:fld>
             <a:endParaRPr lang="en-US"/>
           </a:p>
@@ -661,7 +670,7 @@
           <a:p>
             <a:fld id="{833070CE-4CF3-4BD2-9D46-3CFBC9E43154}" type="datetimeFigureOut">
               <a:rPr lang="en-US" smtClean="0"/>
-              <a:t>11/27/2021</a:t>
+              <a:t>11/29/2021</a:t>
             </a:fld>
             <a:endParaRPr lang="en-US"/>
           </a:p>
@@ -859,7 +868,7 @@
           <a:p>
             <a:fld id="{833070CE-4CF3-4BD2-9D46-3CFBC9E43154}" type="datetimeFigureOut">
               <a:rPr lang="en-US" smtClean="0"/>
-              <a:t>11/27/2021</a:t>
+              <a:t>11/29/2021</a:t>
             </a:fld>
             <a:endParaRPr lang="en-US"/>
           </a:p>
@@ -1134,7 +1143,7 @@
           <a:p>
             <a:fld id="{833070CE-4CF3-4BD2-9D46-3CFBC9E43154}" type="datetimeFigureOut">
               <a:rPr lang="en-US" smtClean="0"/>
-              <a:t>11/27/2021</a:t>
+              <a:t>11/29/2021</a:t>
             </a:fld>
             <a:endParaRPr lang="en-US"/>
           </a:p>
@@ -1399,7 +1408,7 @@
           <a:p>
             <a:fld id="{833070CE-4CF3-4BD2-9D46-3CFBC9E43154}" type="datetimeFigureOut">
               <a:rPr lang="en-US" smtClean="0"/>
-              <a:t>11/27/2021</a:t>
+              <a:t>11/29/2021</a:t>
             </a:fld>
             <a:endParaRPr lang="en-US"/>
           </a:p>
@@ -1811,7 +1820,7 @@
           <a:p>
             <a:fld id="{833070CE-4CF3-4BD2-9D46-3CFBC9E43154}" type="datetimeFigureOut">
               <a:rPr lang="en-US" smtClean="0"/>
-              <a:t>11/27/2021</a:t>
+              <a:t>11/29/2021</a:t>
             </a:fld>
             <a:endParaRPr lang="en-US"/>
           </a:p>
@@ -1952,7 +1961,7 @@
           <a:p>
             <a:fld id="{833070CE-4CF3-4BD2-9D46-3CFBC9E43154}" type="datetimeFigureOut">
               <a:rPr lang="en-US" smtClean="0"/>
-              <a:t>11/27/2021</a:t>
+              <a:t>11/29/2021</a:t>
             </a:fld>
             <a:endParaRPr lang="en-US"/>
           </a:p>
@@ -2065,7 +2074,7 @@
           <a:p>
             <a:fld id="{833070CE-4CF3-4BD2-9D46-3CFBC9E43154}" type="datetimeFigureOut">
               <a:rPr lang="en-US" smtClean="0"/>
-              <a:t>11/27/2021</a:t>
+              <a:t>11/29/2021</a:t>
             </a:fld>
             <a:endParaRPr lang="en-US"/>
           </a:p>
@@ -2376,7 +2385,7 @@
           <a:p>
             <a:fld id="{833070CE-4CF3-4BD2-9D46-3CFBC9E43154}" type="datetimeFigureOut">
               <a:rPr lang="en-US" smtClean="0"/>
-              <a:t>11/27/2021</a:t>
+              <a:t>11/29/2021</a:t>
             </a:fld>
             <a:endParaRPr lang="en-US"/>
           </a:p>
@@ -2664,7 +2673,7 @@
           <a:p>
             <a:fld id="{833070CE-4CF3-4BD2-9D46-3CFBC9E43154}" type="datetimeFigureOut">
               <a:rPr lang="en-US" smtClean="0"/>
-              <a:t>11/27/2021</a:t>
+              <a:t>11/29/2021</a:t>
             </a:fld>
             <a:endParaRPr lang="en-US"/>
           </a:p>
@@ -2905,7 +2914,7 @@
           <a:p>
             <a:fld id="{833070CE-4CF3-4BD2-9D46-3CFBC9E43154}" type="datetimeFigureOut">
               <a:rPr lang="en-US" smtClean="0"/>
-              <a:t>11/27/2021</a:t>
+              <a:t>11/29/2021</a:t>
             </a:fld>
             <a:endParaRPr lang="en-US"/>
           </a:p>
@@ -3363,31 +3372,6 @@
           </a:p>
         </p:txBody>
       </p:sp>
-      <p:sp>
-        <p:nvSpPr>
-          <p:cNvPr id="3" name="Subtitle 2">
-            <a:extLst>
-              <a:ext uri="{FF2B5EF4-FFF2-40B4-BE49-F238E27FC236}">
-                <a16:creationId xmlns:a16="http://schemas.microsoft.com/office/drawing/2014/main" id="{426DCD9C-BF88-463B-962E-654FA224A015}"/>
-              </a:ext>
-            </a:extLst>
-          </p:cNvPr>
-          <p:cNvSpPr>
-            <a:spLocks noGrp="1"/>
-          </p:cNvSpPr>
-          <p:nvPr>
-            <p:ph type="subTitle" idx="1"/>
-          </p:nvPr>
-        </p:nvSpPr>
-        <p:spPr/>
-        <p:txBody>
-          <a:bodyPr/>
-          <a:lstStyle/>
-          <a:p>
-            <a:endParaRPr lang="en-US"/>
-          </a:p>
-        </p:txBody>
-      </p:sp>
     </p:spTree>
     <p:extLst>
       <p:ext uri="{BB962C8B-B14F-4D97-AF65-F5344CB8AC3E}">
@@ -3404,6 +3388,14 @@
 <file path=ppt/slides/slide2.xml><?xml version="1.0" encoding="utf-8"?>
 <p:sld xmlns:a="http://schemas.openxmlformats.org/drawingml/2006/main" xmlns:r="http://schemas.openxmlformats.org/officeDocument/2006/relationships" xmlns:p="http://schemas.openxmlformats.org/presentationml/2006/main">
   <p:cSld>
+    <p:bg>
+      <p:bgPr>
+        <a:solidFill>
+          <a:schemeClr val="bg1"/>
+        </a:solidFill>
+        <a:effectLst/>
+      </p:bgPr>
+    </p:bg>
     <p:spTree>
       <p:nvGrpSpPr>
         <p:cNvPr id="1" name=""/>
@@ -3418,63 +3410,513 @@
           <a:chExt cx="0" cy="0"/>
         </a:xfrm>
       </p:grpSpPr>
-      <p:sp>
-        <p:nvSpPr>
-          <p:cNvPr id="2" name="Title 1">
-            <a:extLst>
-              <a:ext uri="{FF2B5EF4-FFF2-40B4-BE49-F238E27FC236}">
-                <a16:creationId xmlns:a16="http://schemas.microsoft.com/office/drawing/2014/main" id="{992442A5-344A-4A8E-9F43-D4772EEC7958}"/>
-              </a:ext>
-            </a:extLst>
-          </p:cNvPr>
-          <p:cNvSpPr>
-            <a:spLocks noGrp="1"/>
-          </p:cNvSpPr>
-          <p:nvPr>
-            <p:ph type="title"/>
-          </p:nvPr>
-        </p:nvSpPr>
-        <p:spPr/>
-        <p:txBody>
-          <a:bodyPr/>
-          <a:lstStyle/>
-          <a:p>
-            <a:endParaRPr lang="en-US" dirty="0"/>
-          </a:p>
-        </p:txBody>
-      </p:sp>
-      <p:sp>
-        <p:nvSpPr>
-          <p:cNvPr id="3" name="Content Placeholder 2">
-            <a:extLst>
-              <a:ext uri="{FF2B5EF4-FFF2-40B4-BE49-F238E27FC236}">
-                <a16:creationId xmlns:a16="http://schemas.microsoft.com/office/drawing/2014/main" id="{AC688779-195D-4449-A295-D214F7CE606F}"/>
-              </a:ext>
-            </a:extLst>
-          </p:cNvPr>
-          <p:cNvSpPr>
-            <a:spLocks noGrp="1"/>
-          </p:cNvSpPr>
-          <p:nvPr>
-            <p:ph idx="1"/>
-          </p:nvPr>
-        </p:nvSpPr>
-        <p:spPr/>
-        <p:txBody>
-          <a:bodyPr/>
-          <a:lstStyle/>
-          <a:p>
-            <a:r>
-              <a:rPr lang="en-US"/>
-              <a:t> </a:t>
-            </a:r>
-          </a:p>
-        </p:txBody>
-      </p:sp>
+      <p:sp useBgFill="1">
+        <p:nvSpPr>
+          <p:cNvPr id="23" name="Rectangle 22">
+            <a:extLst>
+              <a:ext uri="{FF2B5EF4-FFF2-40B4-BE49-F238E27FC236}">
+                <a16:creationId xmlns:a16="http://schemas.microsoft.com/office/drawing/2014/main" id="{11BE3FA7-0D70-4431-814F-D8C40576EA93}"/>
+              </a:ext>
+              <a:ext uri="{C183D7F6-B498-43B3-948B-1728B52AA6E4}">
+                <adec:decorative xmlns:adec="http://schemas.microsoft.com/office/drawing/2017/decorative" val="1"/>
+              </a:ext>
+            </a:extLst>
+          </p:cNvPr>
+          <p:cNvSpPr>
+            <a:spLocks noGrp="1" noRot="1" noChangeAspect="1" noMove="1" noResize="1" noEditPoints="1" noAdjustHandles="1" noChangeArrowheads="1" noChangeShapeType="1" noTextEdit="1"/>
+          </p:cNvSpPr>
+          <p:nvPr>
+            <p:extLst>
+              <p:ext uri="{386F3935-93C4-4BCD-93E2-E3B085C9AB24}">
+                <p16:designElem xmlns:p16="http://schemas.microsoft.com/office/powerpoint/2015/main" val="1"/>
+              </p:ext>
+            </p:extLst>
+          </p:nvPr>
+        </p:nvSpPr>
+        <p:spPr bwMode="white">
+          <a:xfrm>
+            <a:off x="1524" y="0"/>
+            <a:ext cx="12188952" cy="6858000"/>
+          </a:xfrm>
+          <a:prstGeom prst="rect">
+            <a:avLst/>
+          </a:prstGeom>
+          <a:ln>
+            <a:noFill/>
+          </a:ln>
+        </p:spPr>
+        <p:style>
+          <a:lnRef idx="2">
+            <a:schemeClr val="accent1">
+              <a:shade val="50000"/>
+            </a:schemeClr>
+          </a:lnRef>
+          <a:fillRef idx="1">
+            <a:schemeClr val="accent1"/>
+          </a:fillRef>
+          <a:effectRef idx="0">
+            <a:schemeClr val="accent1"/>
+          </a:effectRef>
+          <a:fontRef idx="minor">
+            <a:schemeClr val="lt1"/>
+          </a:fontRef>
+        </p:style>
+        <p:txBody>
+          <a:bodyPr rtlCol="0" anchor="ctr"/>
+          <a:lstStyle>
+            <a:defPPr>
+              <a:defRPr lang="en-US"/>
+            </a:defPPr>
+            <a:lvl1pPr marL="0" algn="l" defTabSz="914400" rtl="0" eaLnBrk="1" latinLnBrk="0" hangingPunct="1">
+              <a:defRPr sz="1800" kern="1200">
+                <a:solidFill>
+                  <a:schemeClr val="lt1"/>
+                </a:solidFill>
+                <a:latin typeface="+mn-lt"/>
+                <a:ea typeface="+mn-ea"/>
+                <a:cs typeface="+mn-cs"/>
+              </a:defRPr>
+            </a:lvl1pPr>
+            <a:lvl2pPr marL="457200" algn="l" defTabSz="914400" rtl="0" eaLnBrk="1" latinLnBrk="0" hangingPunct="1">
+              <a:defRPr sz="1800" kern="1200">
+                <a:solidFill>
+                  <a:schemeClr val="lt1"/>
+                </a:solidFill>
+                <a:latin typeface="+mn-lt"/>
+                <a:ea typeface="+mn-ea"/>
+                <a:cs typeface="+mn-cs"/>
+              </a:defRPr>
+            </a:lvl2pPr>
+            <a:lvl3pPr marL="914400" algn="l" defTabSz="914400" rtl="0" eaLnBrk="1" latinLnBrk="0" hangingPunct="1">
+              <a:defRPr sz="1800" kern="1200">
+                <a:solidFill>
+                  <a:schemeClr val="lt1"/>
+                </a:solidFill>
+                <a:latin typeface="+mn-lt"/>
+                <a:ea typeface="+mn-ea"/>
+                <a:cs typeface="+mn-cs"/>
+              </a:defRPr>
+            </a:lvl3pPr>
+            <a:lvl4pPr marL="1371600" algn="l" defTabSz="914400" rtl="0" eaLnBrk="1" latinLnBrk="0" hangingPunct="1">
+              <a:defRPr sz="1800" kern="1200">
+                <a:solidFill>
+                  <a:schemeClr val="lt1"/>
+                </a:solidFill>
+                <a:latin typeface="+mn-lt"/>
+                <a:ea typeface="+mn-ea"/>
+                <a:cs typeface="+mn-cs"/>
+              </a:defRPr>
+            </a:lvl4pPr>
+            <a:lvl5pPr marL="1828800" algn="l" defTabSz="914400" rtl="0" eaLnBrk="1" latinLnBrk="0" hangingPunct="1">
+              <a:defRPr sz="1800" kern="1200">
+                <a:solidFill>
+                  <a:schemeClr val="lt1"/>
+                </a:solidFill>
+                <a:latin typeface="+mn-lt"/>
+                <a:ea typeface="+mn-ea"/>
+                <a:cs typeface="+mn-cs"/>
+              </a:defRPr>
+            </a:lvl5pPr>
+            <a:lvl6pPr marL="2286000" algn="l" defTabSz="914400" rtl="0" eaLnBrk="1" latinLnBrk="0" hangingPunct="1">
+              <a:defRPr sz="1800" kern="1200">
+                <a:solidFill>
+                  <a:schemeClr val="lt1"/>
+                </a:solidFill>
+                <a:latin typeface="+mn-lt"/>
+                <a:ea typeface="+mn-ea"/>
+                <a:cs typeface="+mn-cs"/>
+              </a:defRPr>
+            </a:lvl6pPr>
+            <a:lvl7pPr marL="2743200" algn="l" defTabSz="914400" rtl="0" eaLnBrk="1" latinLnBrk="0" hangingPunct="1">
+              <a:defRPr sz="1800" kern="1200">
+                <a:solidFill>
+                  <a:schemeClr val="lt1"/>
+                </a:solidFill>
+                <a:latin typeface="+mn-lt"/>
+                <a:ea typeface="+mn-ea"/>
+                <a:cs typeface="+mn-cs"/>
+              </a:defRPr>
+            </a:lvl7pPr>
+            <a:lvl8pPr marL="3200400" algn="l" defTabSz="914400" rtl="0" eaLnBrk="1" latinLnBrk="0" hangingPunct="1">
+              <a:defRPr sz="1800" kern="1200">
+                <a:solidFill>
+                  <a:schemeClr val="lt1"/>
+                </a:solidFill>
+                <a:latin typeface="+mn-lt"/>
+                <a:ea typeface="+mn-ea"/>
+                <a:cs typeface="+mn-cs"/>
+              </a:defRPr>
+            </a:lvl8pPr>
+            <a:lvl9pPr marL="3657600" algn="l" defTabSz="914400" rtl="0" eaLnBrk="1" latinLnBrk="0" hangingPunct="1">
+              <a:defRPr sz="1800" kern="1200">
+                <a:solidFill>
+                  <a:schemeClr val="lt1"/>
+                </a:solidFill>
+                <a:latin typeface="+mn-lt"/>
+                <a:ea typeface="+mn-ea"/>
+                <a:cs typeface="+mn-cs"/>
+              </a:defRPr>
+            </a:lvl9pPr>
+          </a:lstStyle>
+          <a:p>
+            <a:pPr algn="ctr"/>
+            <a:endParaRPr lang="en-US"/>
+          </a:p>
+        </p:txBody>
+      </p:sp>
+      <p:pic>
+        <p:nvPicPr>
+          <p:cNvPr id="26" name="Picture 25" descr="Map&#10;&#10;Description automatically generated">
+            <a:extLst>
+              <a:ext uri="{FF2B5EF4-FFF2-40B4-BE49-F238E27FC236}">
+                <a16:creationId xmlns:a16="http://schemas.microsoft.com/office/drawing/2014/main" id="{622F8673-3D19-4419-9E42-B1A334AD070C}"/>
+              </a:ext>
+            </a:extLst>
+          </p:cNvPr>
+          <p:cNvPicPr>
+            <a:picLocks noChangeAspect="1"/>
+          </p:cNvPicPr>
+          <p:nvPr/>
+        </p:nvPicPr>
+        <p:blipFill>
+          <a:blip r:embed="rId2">
+            <a:extLst>
+              <a:ext uri="{28A0092B-C50C-407E-A947-70E740481C1C}">
+                <a14:useLocalDpi xmlns:a14="http://schemas.microsoft.com/office/drawing/2010/main" val="0"/>
+              </a:ext>
+            </a:extLst>
+          </a:blip>
+          <a:stretch>
+            <a:fillRect/>
+          </a:stretch>
+        </p:blipFill>
+        <p:spPr>
+          <a:xfrm>
+            <a:off x="495301" y="1"/>
+            <a:ext cx="11205468" cy="6860490"/>
+          </a:xfrm>
+          <a:prstGeom prst="rect">
+            <a:avLst/>
+          </a:prstGeom>
+        </p:spPr>
+      </p:pic>
+      <p:pic>
+        <p:nvPicPr>
+          <p:cNvPr id="28" name="Picture 27">
+            <a:extLst>
+              <a:ext uri="{FF2B5EF4-FFF2-40B4-BE49-F238E27FC236}">
+                <a16:creationId xmlns:a16="http://schemas.microsoft.com/office/drawing/2014/main" id="{651C3FC3-901B-45A9-8941-1C21788F33E7}"/>
+              </a:ext>
+            </a:extLst>
+          </p:cNvPr>
+          <p:cNvPicPr>
+            <a:picLocks noChangeAspect="1"/>
+          </p:cNvPicPr>
+          <p:nvPr/>
+        </p:nvPicPr>
+        <p:blipFill>
+          <a:blip r:embed="rId3"/>
+          <a:stretch>
+            <a:fillRect/>
+          </a:stretch>
+        </p:blipFill>
+        <p:spPr>
+          <a:xfrm>
+            <a:off x="491231" y="5371893"/>
+            <a:ext cx="1124107" cy="1486107"/>
+          </a:xfrm>
+          <a:prstGeom prst="rect">
+            <a:avLst/>
+          </a:prstGeom>
+        </p:spPr>
+      </p:pic>
+    </p:spTree>
+    <p:extLst>
+      <p:ext uri="{BB962C8B-B14F-4D97-AF65-F5344CB8AC3E}">
+        <p14:creationId xmlns:p14="http://schemas.microsoft.com/office/powerpoint/2010/main" val="1110585610"/>
+      </p:ext>
+    </p:extLst>
+  </p:cSld>
+  <p:clrMapOvr>
+    <a:masterClrMapping/>
+  </p:clrMapOvr>
+</p:sld>
+</file>
+
+<file path=ppt/slides/slide3.xml><?xml version="1.0" encoding="utf-8"?>
+<p:sld xmlns:a="http://schemas.openxmlformats.org/drawingml/2006/main" xmlns:r="http://schemas.openxmlformats.org/officeDocument/2006/relationships" xmlns:p="http://schemas.openxmlformats.org/presentationml/2006/main">
+  <p:cSld>
+    <p:spTree>
+      <p:nvGrpSpPr>
+        <p:cNvPr id="1" name=""/>
+        <p:cNvGrpSpPr/>
+        <p:nvPr/>
+      </p:nvGrpSpPr>
+      <p:grpSpPr>
+        <a:xfrm>
+          <a:off x="0" y="0"/>
+          <a:ext cx="0" cy="0"/>
+          <a:chOff x="0" y="0"/>
+          <a:chExt cx="0" cy="0"/>
+        </a:xfrm>
+      </p:grpSpPr>
+      <p:pic>
+        <p:nvPicPr>
+          <p:cNvPr id="7" name="Picture 6" descr="Map&#10;&#10;Description automatically generated">
+            <a:extLst>
+              <a:ext uri="{FF2B5EF4-FFF2-40B4-BE49-F238E27FC236}">
+                <a16:creationId xmlns:a16="http://schemas.microsoft.com/office/drawing/2014/main" id="{477590F1-2401-45E1-BBEE-3EDEF4D6C201}"/>
+              </a:ext>
+            </a:extLst>
+          </p:cNvPr>
+          <p:cNvPicPr>
+            <a:picLocks noChangeAspect="1"/>
+          </p:cNvPicPr>
+          <p:nvPr/>
+        </p:nvPicPr>
+        <p:blipFill>
+          <a:blip r:embed="rId2">
+            <a:extLst>
+              <a:ext uri="{28A0092B-C50C-407E-A947-70E740481C1C}">
+                <a14:useLocalDpi xmlns:a14="http://schemas.microsoft.com/office/drawing/2010/main" val="0"/>
+              </a:ext>
+            </a:extLst>
+          </a:blip>
+          <a:stretch>
+            <a:fillRect/>
+          </a:stretch>
+        </p:blipFill>
+        <p:spPr>
+          <a:xfrm>
+            <a:off x="495300" y="0"/>
+            <a:ext cx="11201400" cy="6858000"/>
+          </a:xfrm>
+          <a:prstGeom prst="rect">
+            <a:avLst/>
+          </a:prstGeom>
+        </p:spPr>
+      </p:pic>
+      <p:pic>
+        <p:nvPicPr>
+          <p:cNvPr id="13" name="Picture 12">
+            <a:extLst>
+              <a:ext uri="{FF2B5EF4-FFF2-40B4-BE49-F238E27FC236}">
+                <a16:creationId xmlns:a16="http://schemas.microsoft.com/office/drawing/2014/main" id="{08712A2F-3A27-459D-A3B4-CF0E330277EF}"/>
+              </a:ext>
+            </a:extLst>
+          </p:cNvPr>
+          <p:cNvPicPr>
+            <a:picLocks noChangeAspect="1"/>
+          </p:cNvPicPr>
+          <p:nvPr/>
+        </p:nvPicPr>
+        <p:blipFill>
+          <a:blip r:embed="rId3"/>
+          <a:stretch>
+            <a:fillRect/>
+          </a:stretch>
+        </p:blipFill>
+        <p:spPr>
+          <a:xfrm>
+            <a:off x="861936" y="5429143"/>
+            <a:ext cx="1095528" cy="1524213"/>
+          </a:xfrm>
+          <a:prstGeom prst="rect">
+            <a:avLst/>
+          </a:prstGeom>
+        </p:spPr>
+      </p:pic>
     </p:spTree>
     <p:extLst>
       <p:ext uri="{BB962C8B-B14F-4D97-AF65-F5344CB8AC3E}">
         <p14:creationId xmlns:p14="http://schemas.microsoft.com/office/powerpoint/2010/main" val="960453386"/>
+      </p:ext>
+    </p:extLst>
+  </p:cSld>
+  <p:clrMapOvr>
+    <a:masterClrMapping/>
+  </p:clrMapOvr>
+</p:sld>
+</file>
+
+<file path=ppt/slides/slide4.xml><?xml version="1.0" encoding="utf-8"?>
+<p:sld xmlns:a="http://schemas.openxmlformats.org/drawingml/2006/main" xmlns:r="http://schemas.openxmlformats.org/officeDocument/2006/relationships" xmlns:p="http://schemas.openxmlformats.org/presentationml/2006/main">
+  <p:cSld>
+    <p:spTree>
+      <p:nvGrpSpPr>
+        <p:cNvPr id="1" name=""/>
+        <p:cNvGrpSpPr/>
+        <p:nvPr/>
+      </p:nvGrpSpPr>
+      <p:grpSpPr>
+        <a:xfrm>
+          <a:off x="0" y="0"/>
+          <a:ext cx="0" cy="0"/>
+          <a:chOff x="0" y="0"/>
+          <a:chExt cx="0" cy="0"/>
+        </a:xfrm>
+      </p:grpSpPr>
+      <p:pic>
+        <p:nvPicPr>
+          <p:cNvPr id="11" name="Picture 10" descr="Map&#10;&#10;Description automatically generated">
+            <a:extLst>
+              <a:ext uri="{FF2B5EF4-FFF2-40B4-BE49-F238E27FC236}">
+                <a16:creationId xmlns:a16="http://schemas.microsoft.com/office/drawing/2014/main" id="{24C25D2A-BD92-446E-830F-871A4F2633E0}"/>
+              </a:ext>
+            </a:extLst>
+          </p:cNvPr>
+          <p:cNvPicPr>
+            <a:picLocks noChangeAspect="1"/>
+          </p:cNvPicPr>
+          <p:nvPr/>
+        </p:nvPicPr>
+        <p:blipFill>
+          <a:blip r:embed="rId2">
+            <a:extLst>
+              <a:ext uri="{28A0092B-C50C-407E-A947-70E740481C1C}">
+                <a14:useLocalDpi xmlns:a14="http://schemas.microsoft.com/office/drawing/2010/main" val="0"/>
+              </a:ext>
+            </a:extLst>
+          </a:blip>
+          <a:stretch>
+            <a:fillRect/>
+          </a:stretch>
+        </p:blipFill>
+        <p:spPr>
+          <a:xfrm>
+            <a:off x="428625" y="0"/>
+            <a:ext cx="11334750" cy="7100528"/>
+          </a:xfrm>
+          <a:prstGeom prst="rect">
+            <a:avLst/>
+          </a:prstGeom>
+        </p:spPr>
+      </p:pic>
+    </p:spTree>
+    <p:extLst>
+      <p:ext uri="{BB962C8B-B14F-4D97-AF65-F5344CB8AC3E}">
+        <p14:creationId xmlns:p14="http://schemas.microsoft.com/office/powerpoint/2010/main" val="4287520216"/>
+      </p:ext>
+    </p:extLst>
+  </p:cSld>
+  <p:clrMapOvr>
+    <a:masterClrMapping/>
+  </p:clrMapOvr>
+</p:sld>
+</file>
+
+<file path=ppt/slides/slide5.xml><?xml version="1.0" encoding="utf-8"?>
+<p:sld xmlns:a="http://schemas.openxmlformats.org/drawingml/2006/main" xmlns:r="http://schemas.openxmlformats.org/officeDocument/2006/relationships" xmlns:p="http://schemas.openxmlformats.org/presentationml/2006/main">
+  <p:cSld>
+    <p:spTree>
+      <p:nvGrpSpPr>
+        <p:cNvPr id="1" name=""/>
+        <p:cNvGrpSpPr/>
+        <p:nvPr/>
+      </p:nvGrpSpPr>
+      <p:grpSpPr>
+        <a:xfrm>
+          <a:off x="0" y="0"/>
+          <a:ext cx="0" cy="0"/>
+          <a:chOff x="0" y="0"/>
+          <a:chExt cx="0" cy="0"/>
+        </a:xfrm>
+      </p:grpSpPr>
+      <p:pic>
+        <p:nvPicPr>
+          <p:cNvPr id="5" name="Picture 4" descr="Map&#10;&#10;Description automatically generated">
+            <a:extLst>
+              <a:ext uri="{FF2B5EF4-FFF2-40B4-BE49-F238E27FC236}">
+                <a16:creationId xmlns:a16="http://schemas.microsoft.com/office/drawing/2014/main" id="{1D2A450A-71AF-4646-B112-6EA1B779154D}"/>
+              </a:ext>
+            </a:extLst>
+          </p:cNvPr>
+          <p:cNvPicPr>
+            <a:picLocks noChangeAspect="1"/>
+          </p:cNvPicPr>
+          <p:nvPr/>
+        </p:nvPicPr>
+        <p:blipFill>
+          <a:blip r:embed="rId2">
+            <a:extLst>
+              <a:ext uri="{28A0092B-C50C-407E-A947-70E740481C1C}">
+                <a14:useLocalDpi xmlns:a14="http://schemas.microsoft.com/office/drawing/2010/main" val="0"/>
+              </a:ext>
+            </a:extLst>
+          </a:blip>
+          <a:stretch>
+            <a:fillRect/>
+          </a:stretch>
+        </p:blipFill>
+        <p:spPr>
+          <a:xfrm>
+            <a:off x="1052512" y="-1614488"/>
+            <a:ext cx="10086975" cy="10086975"/>
+          </a:xfrm>
+          <a:prstGeom prst="rect">
+            <a:avLst/>
+          </a:prstGeom>
+        </p:spPr>
+      </p:pic>
+    </p:spTree>
+    <p:extLst>
+      <p:ext uri="{BB962C8B-B14F-4D97-AF65-F5344CB8AC3E}">
+        <p14:creationId xmlns:p14="http://schemas.microsoft.com/office/powerpoint/2010/main" val="2917275504"/>
+      </p:ext>
+    </p:extLst>
+  </p:cSld>
+  <p:clrMapOvr>
+    <a:masterClrMapping/>
+  </p:clrMapOvr>
+</p:sld>
+</file>
+
+<file path=ppt/slides/slide6.xml><?xml version="1.0" encoding="utf-8"?>
+<p:sld xmlns:a="http://schemas.openxmlformats.org/drawingml/2006/main" xmlns:r="http://schemas.openxmlformats.org/officeDocument/2006/relationships" xmlns:p="http://schemas.openxmlformats.org/presentationml/2006/main">
+  <p:cSld>
+    <p:spTree>
+      <p:nvGrpSpPr>
+        <p:cNvPr id="1" name=""/>
+        <p:cNvGrpSpPr/>
+        <p:nvPr/>
+      </p:nvGrpSpPr>
+      <p:grpSpPr>
+        <a:xfrm>
+          <a:off x="0" y="0"/>
+          <a:ext cx="0" cy="0"/>
+          <a:chOff x="0" y="0"/>
+          <a:chExt cx="0" cy="0"/>
+        </a:xfrm>
+      </p:grpSpPr>
+      <p:sp>
+        <p:nvSpPr>
+          <p:cNvPr id="7" name="Content Placeholder 6">
+            <a:extLst>
+              <a:ext uri="{FF2B5EF4-FFF2-40B4-BE49-F238E27FC236}">
+                <a16:creationId xmlns:a16="http://schemas.microsoft.com/office/drawing/2014/main" id="{559C86A9-4966-426C-9FE1-C614632D4603}"/>
+              </a:ext>
+            </a:extLst>
+          </p:cNvPr>
+          <p:cNvSpPr>
+            <a:spLocks noGrp="1"/>
+          </p:cNvSpPr>
+          <p:nvPr>
+            <p:ph idx="1"/>
+          </p:nvPr>
+        </p:nvSpPr>
+        <p:spPr/>
+        <p:txBody>
+          <a:bodyPr/>
+          <a:lstStyle/>
+          <a:p>
+            <a:endParaRPr lang="en-US"/>
+          </a:p>
+        </p:txBody>
+      </p:sp>
+    </p:spTree>
+    <p:extLst>
+      <p:ext uri="{BB962C8B-B14F-4D97-AF65-F5344CB8AC3E}">
+        <p14:creationId xmlns:p14="http://schemas.microsoft.com/office/powerpoint/2010/main" val="2006245565"/>
       </p:ext>
     </p:extLst>
   </p:cSld>

</xml_diff>